<commit_message>
Made project changes and started PPT
Eliminated unnecessary functions and began PPT presentation
</commit_message>
<xml_diff>
--- a/Proj3_Presentation_WalkerHaycraft.pptx
+++ b/Proj3_Presentation_WalkerHaycraft.pptx
@@ -6,6 +6,12 @@
   </p:sldMasterIdLst>
   <p:sldIdLst>
     <p:sldId id="256" r:id="rId2"/>
+    <p:sldId id="257" r:id="rId3"/>
+    <p:sldId id="258" r:id="rId4"/>
+    <p:sldId id="259" r:id="rId5"/>
+    <p:sldId id="260" r:id="rId6"/>
+    <p:sldId id="261" r:id="rId7"/>
+    <p:sldId id="262" r:id="rId8"/>
   </p:sldIdLst>
   <p:sldSz cx="9144000" cy="6858000" type="screen4x3"/>
   <p:notesSz cx="6858000" cy="9144000"/>
@@ -344,7 +350,7 @@
           <a:p>
             <a:fld id="{2069C06D-4ED8-42C6-905D-CA84CA1B6CBF}" type="datetime2">
               <a:rPr lang="en-US" smtClean="0"/>
-              <a:t>Monday, May 5, 14</a:t>
+              <a:t>Monday, May 05, 2014</a:t>
             </a:fld>
             <a:endParaRPr lang="en-US" dirty="0"/>
           </a:p>
@@ -515,7 +521,7 @@
           <a:p>
             <a:fld id="{A56EEE0E-EDB0-4D84-86B0-50833DF22902}" type="datetime2">
               <a:rPr lang="en-US" smtClean="0"/>
-              <a:t>Monday, May 5, 14</a:t>
+              <a:t>Monday, May 05, 2014</a:t>
             </a:fld>
             <a:endParaRPr lang="en-US"/>
           </a:p>
@@ -691,7 +697,7 @@
           <a:p>
             <a:fld id="{5114372C-B5AB-4C39-B273-B99224EB4DD5}" type="datetime2">
               <a:rPr lang="en-US" smtClean="0"/>
-              <a:t>Monday, May 5, 14</a:t>
+              <a:t>Monday, May 05, 2014</a:t>
             </a:fld>
             <a:endParaRPr lang="en-US"/>
           </a:p>
@@ -857,7 +863,7 @@
           <a:p>
             <a:fld id="{14CB1CAA-32CD-4B55-B92A-B8F0843CACF4}" type="datetime2">
               <a:rPr lang="en-US" smtClean="0"/>
-              <a:t>Monday, May 5, 14</a:t>
+              <a:t>Monday, May 05, 2014</a:t>
             </a:fld>
             <a:endParaRPr lang="en-US" dirty="0"/>
           </a:p>
@@ -1115,7 +1121,7 @@
           <a:p>
             <a:fld id="{3AD8CDC4-3D19-4983-B478-82F6B8E5AB66}" type="datetime2">
               <a:rPr lang="en-US" smtClean="0"/>
-              <a:t>Monday, May 5, 14</a:t>
+              <a:t>Monday, May 05, 2014</a:t>
             </a:fld>
             <a:endParaRPr lang="en-US" dirty="0"/>
           </a:p>
@@ -1256,7 +1262,7 @@
           <a:p>
             <a:fld id="{84B82477-D5D3-4181-8C11-75D0F2433A87}" type="datetime2">
               <a:rPr lang="en-US" smtClean="0"/>
-              <a:t>Monday, May 5, 14</a:t>
+              <a:t>Monday, May 05, 2014</a:t>
             </a:fld>
             <a:endParaRPr lang="en-US" dirty="0"/>
           </a:p>
@@ -1907,7 +1913,7 @@
           <a:p>
             <a:fld id="{213E253B-1893-4367-8BAE-DF4BC10DC578}" type="datetime2">
               <a:rPr lang="en-US" smtClean="0"/>
-              <a:t>Monday, May 5, 14</a:t>
+              <a:t>Monday, May 05, 2014</a:t>
             </a:fld>
             <a:endParaRPr lang="en-US" dirty="0"/>
           </a:p>
@@ -2021,7 +2027,7 @@
           <a:p>
             <a:fld id="{8B62300D-25B3-4603-86C9-4CB776489F00}" type="datetime2">
               <a:rPr lang="en-US" smtClean="0"/>
-              <a:t>Monday, May 5, 14</a:t>
+              <a:t>Monday, May 05, 2014</a:t>
             </a:fld>
             <a:endParaRPr lang="en-US" dirty="0"/>
           </a:p>
@@ -2112,7 +2118,7 @@
           <a:p>
             <a:fld id="{C6314AD9-FCC8-48B7-B85B-012A91320DFF}" type="datetime2">
               <a:rPr lang="en-US" smtClean="0"/>
-              <a:t>Monday, May 5, 14</a:t>
+              <a:t>Monday, May 05, 2014</a:t>
             </a:fld>
             <a:endParaRPr lang="en-US" dirty="0"/>
           </a:p>
@@ -2403,7 +2409,7 @@
           <a:p>
             <a:fld id="{3182DC50-D5DB-4F94-B367-9876CD2C4012}" type="datetime2">
               <a:rPr lang="en-US" smtClean="0"/>
-              <a:t>Monday, May 5, 14</a:t>
+              <a:t>Monday, May 05, 2014</a:t>
             </a:fld>
             <a:endParaRPr lang="en-US" dirty="0"/>
           </a:p>
@@ -2727,7 +2733,7 @@
           <a:p>
             <a:fld id="{292EB412-E790-42EA-81FE-2925D3A43D91}" type="datetime2">
               <a:rPr lang="en-US" smtClean="0"/>
-              <a:t>Monday, May 5, 14</a:t>
+              <a:t>Monday, May 05, 2014</a:t>
             </a:fld>
             <a:endParaRPr lang="en-US" dirty="0"/>
           </a:p>
@@ -3185,7 +3191,7 @@
           <a:p>
             <a:fld id="{0B385921-A91A-409C-921C-0E0EC1E750EC}" type="datetime2">
               <a:rPr lang="en-US" smtClean="0"/>
-              <a:t>Monday, May 5, 14</a:t>
+              <a:t>Monday, May 05, 2014</a:t>
             </a:fld>
             <a:endParaRPr lang="en-US" dirty="0"/>
           </a:p>
@@ -3712,7 +3718,18 @@
           <a:bodyPr/>
           <a:lstStyle/>
           <a:p>
-            <a:endParaRPr lang="en-US"/>
+            <a:r>
+              <a:rPr lang="en-US" dirty="0" smtClean="0"/>
+              <a:t>GUI of </a:t>
+            </a:r>
+            <a:br>
+              <a:rPr lang="en-US" dirty="0" smtClean="0"/>
+            </a:br>
+            <a:r>
+              <a:rPr lang="en-US" dirty="0" smtClean="0"/>
+              <a:t>Media Manipulation</a:t>
+            </a:r>
+            <a:endParaRPr lang="en-US" dirty="0"/>
           </a:p>
         </p:txBody>
       </p:sp>
@@ -3731,7 +3748,11 @@
           <a:bodyPr/>
           <a:lstStyle/>
           <a:p>
-            <a:endParaRPr lang="en-US"/>
+            <a:r>
+              <a:rPr lang="en-US" dirty="0" smtClean="0"/>
+              <a:t>Aaron Haycraft and Peter Walker</a:t>
+            </a:r>
+            <a:endParaRPr lang="en-US" dirty="0"/>
           </a:p>
         </p:txBody>
       </p:sp>
@@ -3739,6 +3760,917 @@
     <p:extLst>
       <p:ext uri="{BB962C8B-B14F-4D97-AF65-F5344CB8AC3E}">
         <p14:creationId xmlns:p14="http://schemas.microsoft.com/office/powerpoint/2010/main" val="2691389591"/>
+      </p:ext>
+    </p:extLst>
+  </p:cSld>
+  <p:clrMapOvr>
+    <a:masterClrMapping/>
+  </p:clrMapOvr>
+</p:sld>
+</file>
+
+<file path=ppt/slides/slide2.xml><?xml version="1.0" encoding="utf-8"?>
+<p:sld xmlns:a="http://schemas.openxmlformats.org/drawingml/2006/main" xmlns:r="http://schemas.openxmlformats.org/officeDocument/2006/relationships" xmlns:p="http://schemas.openxmlformats.org/presentationml/2006/main">
+  <p:cSld>
+    <p:spTree>
+      <p:nvGrpSpPr>
+        <p:cNvPr id="1" name=""/>
+        <p:cNvGrpSpPr/>
+        <p:nvPr/>
+      </p:nvGrpSpPr>
+      <p:grpSpPr>
+        <a:xfrm>
+          <a:off x="0" y="0"/>
+          <a:ext cx="0" cy="0"/>
+          <a:chOff x="0" y="0"/>
+          <a:chExt cx="0" cy="0"/>
+        </a:xfrm>
+      </p:grpSpPr>
+      <p:sp>
+        <p:nvSpPr>
+          <p:cNvPr id="2" name="Content Placeholder 1"/>
+          <p:cNvSpPr>
+            <a:spLocks noGrp="1"/>
+          </p:cNvSpPr>
+          <p:nvPr>
+            <p:ph idx="1"/>
+          </p:nvPr>
+        </p:nvSpPr>
+        <p:spPr>
+          <a:xfrm>
+            <a:off x="2133600" y="176636"/>
+            <a:ext cx="6096000" cy="2421076"/>
+          </a:xfrm>
+        </p:spPr>
+        <p:txBody>
+          <a:bodyPr>
+            <a:normAutofit/>
+          </a:bodyPr>
+          <a:lstStyle/>
+          <a:p>
+            <a:r>
+              <a:rPr lang="en-US" sz="2400" dirty="0" smtClean="0"/>
+              <a:t>Combine previous projects into one GUI</a:t>
+            </a:r>
+          </a:p>
+          <a:p>
+            <a:r>
+              <a:rPr lang="en-US" sz="2400" dirty="0" smtClean="0"/>
+              <a:t>GUI is easy to use and understand</a:t>
+            </a:r>
+            <a:endParaRPr lang="en-US" sz="2400" dirty="0"/>
+          </a:p>
+        </p:txBody>
+      </p:sp>
+      <p:sp>
+        <p:nvSpPr>
+          <p:cNvPr id="3" name="Title 2"/>
+          <p:cNvSpPr>
+            <a:spLocks noGrp="1"/>
+          </p:cNvSpPr>
+          <p:nvPr>
+            <p:ph type="title"/>
+          </p:nvPr>
+        </p:nvSpPr>
+        <p:spPr/>
+        <p:txBody>
+          <a:bodyPr/>
+          <a:lstStyle/>
+          <a:p>
+            <a:r>
+              <a:rPr lang="en-US" dirty="0" smtClean="0"/>
+              <a:t>Objective</a:t>
+            </a:r>
+            <a:endParaRPr lang="en-US" dirty="0"/>
+          </a:p>
+        </p:txBody>
+      </p:sp>
+      <p:pic>
+        <p:nvPicPr>
+          <p:cNvPr id="4" name="Picture 3" descr="File Contents Viewer"/>
+          <p:cNvPicPr>
+            <a:picLocks noChangeAspect="1"/>
+          </p:cNvPicPr>
+          <p:nvPr/>
+        </p:nvPicPr>
+        <p:blipFill>
+          <a:blip r:embed="rId2">
+            <a:extLst>
+              <a:ext uri="{28A0092B-C50C-407E-A947-70E740481C1C}">
+                <a14:useLocalDpi xmlns:a14="http://schemas.microsoft.com/office/drawing/2010/main" val="0"/>
+              </a:ext>
+            </a:extLst>
+          </a:blip>
+          <a:stretch>
+            <a:fillRect/>
+          </a:stretch>
+        </p:blipFill>
+        <p:spPr>
+          <a:xfrm>
+            <a:off x="2424546" y="2046413"/>
+            <a:ext cx="5106113" cy="2162477"/>
+          </a:xfrm>
+          <a:prstGeom prst="rect">
+            <a:avLst/>
+          </a:prstGeom>
+        </p:spPr>
+      </p:pic>
+    </p:spTree>
+    <p:extLst>
+      <p:ext uri="{BB962C8B-B14F-4D97-AF65-F5344CB8AC3E}">
+        <p14:creationId xmlns:p14="http://schemas.microsoft.com/office/powerpoint/2010/main" val="582345023"/>
+      </p:ext>
+    </p:extLst>
+  </p:cSld>
+  <p:clrMapOvr>
+    <a:masterClrMapping/>
+  </p:clrMapOvr>
+</p:sld>
+</file>
+
+<file path=ppt/slides/slide3.xml><?xml version="1.0" encoding="utf-8"?>
+<p:sld xmlns:a="http://schemas.openxmlformats.org/drawingml/2006/main" xmlns:r="http://schemas.openxmlformats.org/officeDocument/2006/relationships" xmlns:p="http://schemas.openxmlformats.org/presentationml/2006/main">
+  <p:cSld>
+    <p:spTree>
+      <p:nvGrpSpPr>
+        <p:cNvPr id="1" name=""/>
+        <p:cNvGrpSpPr/>
+        <p:nvPr/>
+      </p:nvGrpSpPr>
+      <p:grpSpPr>
+        <a:xfrm>
+          <a:off x="0" y="0"/>
+          <a:ext cx="0" cy="0"/>
+          <a:chOff x="0" y="0"/>
+          <a:chExt cx="0" cy="0"/>
+        </a:xfrm>
+      </p:grpSpPr>
+      <p:sp>
+        <p:nvSpPr>
+          <p:cNvPr id="3" name="Title 2"/>
+          <p:cNvSpPr>
+            <a:spLocks noGrp="1"/>
+          </p:cNvSpPr>
+          <p:nvPr>
+            <p:ph type="title"/>
+          </p:nvPr>
+        </p:nvSpPr>
+        <p:spPr/>
+        <p:txBody>
+          <a:bodyPr/>
+          <a:lstStyle/>
+          <a:p>
+            <a:r>
+              <a:rPr lang="en-US" dirty="0" smtClean="0"/>
+              <a:t>Approach</a:t>
+            </a:r>
+            <a:endParaRPr lang="en-US" dirty="0"/>
+          </a:p>
+        </p:txBody>
+      </p:sp>
+      <p:pic>
+        <p:nvPicPr>
+          <p:cNvPr id="1026" name="Picture 2" descr="C:\Users\Pilot\AppData\Local\Microsoft\Windows\Temporary Internet Files\Content.IE5\QJCPFGLM\MC900434793[1].png"/>
+          <p:cNvPicPr>
+            <a:picLocks noChangeAspect="1" noChangeArrowheads="1"/>
+          </p:cNvPicPr>
+          <p:nvPr/>
+        </p:nvPicPr>
+        <p:blipFill>
+          <a:blip r:embed="rId2" cstate="email">
+            <a:extLst>
+              <a:ext uri="{28A0092B-C50C-407E-A947-70E740481C1C}">
+                <a14:useLocalDpi xmlns:a14="http://schemas.microsoft.com/office/drawing/2010/main" val="0"/>
+              </a:ext>
+            </a:extLst>
+          </a:blip>
+          <a:srcRect/>
+          <a:stretch>
+            <a:fillRect/>
+          </a:stretch>
+        </p:blipFill>
+        <p:spPr bwMode="auto">
+          <a:xfrm>
+            <a:off x="499197" y="1641475"/>
+            <a:ext cx="1080049" cy="1080049"/>
+          </a:xfrm>
+          <a:prstGeom prst="rect">
+            <a:avLst/>
+          </a:prstGeom>
+          <a:noFill/>
+          <a:extLst>
+            <a:ext uri="{909E8E84-426E-40DD-AFC4-6F175D3DCCD1}">
+              <a14:hiddenFill xmlns:a14="http://schemas.microsoft.com/office/drawing/2010/main">
+                <a:solidFill>
+                  <a:srgbClr val="FFFFFF"/>
+                </a:solidFill>
+              </a14:hiddenFill>
+            </a:ext>
+          </a:extLst>
+        </p:spPr>
+      </p:pic>
+      <p:pic>
+        <p:nvPicPr>
+          <p:cNvPr id="1027" name="Picture 3" descr="C:\Users\Pilot\AppData\Local\Microsoft\Windows\Temporary Internet Files\Content.IE5\7B30U1R1\MC900434795[1].png"/>
+          <p:cNvPicPr>
+            <a:picLocks noChangeAspect="1" noChangeArrowheads="1"/>
+          </p:cNvPicPr>
+          <p:nvPr/>
+        </p:nvPicPr>
+        <p:blipFill>
+          <a:blip r:embed="rId3" cstate="email">
+            <a:extLst>
+              <a:ext uri="{28A0092B-C50C-407E-A947-70E740481C1C}">
+                <a14:useLocalDpi xmlns:a14="http://schemas.microsoft.com/office/drawing/2010/main" val="0"/>
+              </a:ext>
+            </a:extLst>
+          </a:blip>
+          <a:srcRect/>
+          <a:stretch>
+            <a:fillRect/>
+          </a:stretch>
+        </p:blipFill>
+        <p:spPr bwMode="auto">
+          <a:xfrm>
+            <a:off x="592139" y="124403"/>
+            <a:ext cx="1089006" cy="1089006"/>
+          </a:xfrm>
+          <a:prstGeom prst="rect">
+            <a:avLst/>
+          </a:prstGeom>
+          <a:noFill/>
+          <a:extLst>
+            <a:ext uri="{909E8E84-426E-40DD-AFC4-6F175D3DCCD1}">
+              <a14:hiddenFill xmlns:a14="http://schemas.microsoft.com/office/drawing/2010/main">
+                <a:solidFill>
+                  <a:srgbClr val="FFFFFF"/>
+                </a:solidFill>
+              </a14:hiddenFill>
+            </a:ext>
+          </a:extLst>
+        </p:spPr>
+      </p:pic>
+      <p:pic>
+        <p:nvPicPr>
+          <p:cNvPr id="1029" name="Picture 5" descr="C:\Users\Pilot\AppData\Local\Microsoft\Windows\Temporary Internet Files\Content.IE5\2E7DXP1I\MC900434794[1].png"/>
+          <p:cNvPicPr>
+            <a:picLocks noChangeAspect="1" noChangeArrowheads="1"/>
+          </p:cNvPicPr>
+          <p:nvPr/>
+        </p:nvPicPr>
+        <p:blipFill>
+          <a:blip r:embed="rId4" cstate="email">
+            <a:extLst>
+              <a:ext uri="{28A0092B-C50C-407E-A947-70E740481C1C}">
+                <a14:useLocalDpi xmlns:a14="http://schemas.microsoft.com/office/drawing/2010/main" val="0"/>
+              </a:ext>
+            </a:extLst>
+          </a:blip>
+          <a:srcRect/>
+          <a:stretch>
+            <a:fillRect/>
+          </a:stretch>
+        </p:blipFill>
+        <p:spPr bwMode="auto">
+          <a:xfrm>
+            <a:off x="675267" y="2981470"/>
+            <a:ext cx="1151412" cy="1151412"/>
+          </a:xfrm>
+          <a:prstGeom prst="rect">
+            <a:avLst/>
+          </a:prstGeom>
+          <a:noFill/>
+          <a:extLst>
+            <a:ext uri="{909E8E84-426E-40DD-AFC4-6F175D3DCCD1}">
+              <a14:hiddenFill xmlns:a14="http://schemas.microsoft.com/office/drawing/2010/main">
+                <a:solidFill>
+                  <a:srgbClr val="FFFFFF"/>
+                </a:solidFill>
+              </a14:hiddenFill>
+            </a:ext>
+          </a:extLst>
+        </p:spPr>
+      </p:pic>
+      <p:pic>
+        <p:nvPicPr>
+          <p:cNvPr id="1030" name="Picture 6" descr="C:\Users\Pilot\AppData\Local\Microsoft\Windows\Temporary Internet Files\Content.IE5\QJCPFGLM\MC900432583[1].png"/>
+          <p:cNvPicPr>
+            <a:picLocks noChangeAspect="1" noChangeArrowheads="1"/>
+          </p:cNvPicPr>
+          <p:nvPr/>
+        </p:nvPicPr>
+        <p:blipFill>
+          <a:blip r:embed="rId5" cstate="email">
+            <a:extLst>
+              <a:ext uri="{28A0092B-C50C-407E-A947-70E740481C1C}">
+                <a14:useLocalDpi xmlns:a14="http://schemas.microsoft.com/office/drawing/2010/main" val="0"/>
+              </a:ext>
+            </a:extLst>
+          </a:blip>
+          <a:srcRect/>
+          <a:stretch>
+            <a:fillRect/>
+          </a:stretch>
+        </p:blipFill>
+        <p:spPr bwMode="auto">
+          <a:xfrm>
+            <a:off x="2379230" y="3695735"/>
+            <a:ext cx="1122506" cy="1122506"/>
+          </a:xfrm>
+          <a:prstGeom prst="rect">
+            <a:avLst/>
+          </a:prstGeom>
+          <a:noFill/>
+          <a:extLst>
+            <a:ext uri="{909E8E84-426E-40DD-AFC4-6F175D3DCCD1}">
+              <a14:hiddenFill xmlns:a14="http://schemas.microsoft.com/office/drawing/2010/main">
+                <a:solidFill>
+                  <a:srgbClr val="FFFFFF"/>
+                </a:solidFill>
+              </a14:hiddenFill>
+            </a:ext>
+          </a:extLst>
+        </p:spPr>
+      </p:pic>
+      <p:pic>
+        <p:nvPicPr>
+          <p:cNvPr id="1033" name="Picture 9" descr="C:\Users\Pilot\AppData\Local\Microsoft\Windows\Temporary Internet Files\Content.IE5\50U1GNZX\MC900440396[1].png"/>
+          <p:cNvPicPr>
+            <a:picLocks noChangeAspect="1" noChangeArrowheads="1"/>
+          </p:cNvPicPr>
+          <p:nvPr/>
+        </p:nvPicPr>
+        <p:blipFill>
+          <a:blip r:embed="rId6">
+            <a:extLst>
+              <a:ext uri="{28A0092B-C50C-407E-A947-70E740481C1C}">
+                <a14:useLocalDpi xmlns:a14="http://schemas.microsoft.com/office/drawing/2010/main" val="0"/>
+              </a:ext>
+            </a:extLst>
+          </a:blip>
+          <a:srcRect/>
+          <a:stretch>
+            <a:fillRect/>
+          </a:stretch>
+        </p:blipFill>
+        <p:spPr bwMode="auto">
+          <a:xfrm>
+            <a:off x="4686300" y="758825"/>
+            <a:ext cx="2743200" cy="2743200"/>
+          </a:xfrm>
+          <a:prstGeom prst="rect">
+            <a:avLst/>
+          </a:prstGeom>
+          <a:noFill/>
+          <a:extLst>
+            <a:ext uri="{909E8E84-426E-40DD-AFC4-6F175D3DCCD1}">
+              <a14:hiddenFill xmlns:a14="http://schemas.microsoft.com/office/drawing/2010/main">
+                <a:solidFill>
+                  <a:srgbClr val="FFFFFF"/>
+                </a:solidFill>
+              </a14:hiddenFill>
+            </a:ext>
+          </a:extLst>
+        </p:spPr>
+      </p:pic>
+      <p:cxnSp>
+        <p:nvCxnSpPr>
+          <p:cNvPr id="7" name="Straight Connector 6"/>
+          <p:cNvCxnSpPr/>
+          <p:nvPr/>
+        </p:nvCxnSpPr>
+        <p:spPr>
+          <a:xfrm>
+            <a:off x="1579246" y="668906"/>
+            <a:ext cx="3304481" cy="1512593"/>
+          </a:xfrm>
+          <a:prstGeom prst="line">
+            <a:avLst/>
+          </a:prstGeom>
+          <a:ln w="38100"/>
+        </p:spPr>
+        <p:style>
+          <a:lnRef idx="1">
+            <a:schemeClr val="accent1"/>
+          </a:lnRef>
+          <a:fillRef idx="0">
+            <a:schemeClr val="accent1"/>
+          </a:fillRef>
+          <a:effectRef idx="0">
+            <a:schemeClr val="accent1"/>
+          </a:effectRef>
+          <a:fontRef idx="minor">
+            <a:schemeClr val="tx1"/>
+          </a:fontRef>
+        </p:style>
+      </p:cxnSp>
+      <p:cxnSp>
+        <p:nvCxnSpPr>
+          <p:cNvPr id="18" name="Straight Connector 17"/>
+          <p:cNvCxnSpPr/>
+          <p:nvPr/>
+        </p:nvCxnSpPr>
+        <p:spPr>
+          <a:xfrm flipV="1">
+            <a:off x="1433945" y="2181500"/>
+            <a:ext cx="3449782" cy="129974"/>
+          </a:xfrm>
+          <a:prstGeom prst="line">
+            <a:avLst/>
+          </a:prstGeom>
+          <a:ln w="38100"/>
+        </p:spPr>
+        <p:style>
+          <a:lnRef idx="1">
+            <a:schemeClr val="accent1"/>
+          </a:lnRef>
+          <a:fillRef idx="0">
+            <a:schemeClr val="accent1"/>
+          </a:fillRef>
+          <a:effectRef idx="0">
+            <a:schemeClr val="accent1"/>
+          </a:effectRef>
+          <a:fontRef idx="minor">
+            <a:schemeClr val="tx1"/>
+          </a:fontRef>
+        </p:style>
+      </p:cxnSp>
+      <p:cxnSp>
+        <p:nvCxnSpPr>
+          <p:cNvPr id="20" name="Straight Connector 19"/>
+          <p:cNvCxnSpPr/>
+          <p:nvPr/>
+        </p:nvCxnSpPr>
+        <p:spPr>
+          <a:xfrm flipV="1">
+            <a:off x="1805897" y="2181500"/>
+            <a:ext cx="3077830" cy="1109243"/>
+          </a:xfrm>
+          <a:prstGeom prst="line">
+            <a:avLst/>
+          </a:prstGeom>
+          <a:ln w="38100"/>
+        </p:spPr>
+        <p:style>
+          <a:lnRef idx="1">
+            <a:schemeClr val="accent1"/>
+          </a:lnRef>
+          <a:fillRef idx="0">
+            <a:schemeClr val="accent1"/>
+          </a:fillRef>
+          <a:effectRef idx="0">
+            <a:schemeClr val="accent1"/>
+          </a:effectRef>
+          <a:fontRef idx="minor">
+            <a:schemeClr val="tx1"/>
+          </a:fontRef>
+        </p:style>
+      </p:cxnSp>
+      <p:cxnSp>
+        <p:nvCxnSpPr>
+          <p:cNvPr id="22" name="Straight Connector 21"/>
+          <p:cNvCxnSpPr/>
+          <p:nvPr/>
+        </p:nvCxnSpPr>
+        <p:spPr>
+          <a:xfrm flipV="1">
+            <a:off x="3344812" y="2181501"/>
+            <a:ext cx="1538915" cy="1808610"/>
+          </a:xfrm>
+          <a:prstGeom prst="line">
+            <a:avLst/>
+          </a:prstGeom>
+          <a:ln w="38100"/>
+        </p:spPr>
+        <p:style>
+          <a:lnRef idx="1">
+            <a:schemeClr val="accent1"/>
+          </a:lnRef>
+          <a:fillRef idx="0">
+            <a:schemeClr val="accent1"/>
+          </a:fillRef>
+          <a:effectRef idx="0">
+            <a:schemeClr val="accent1"/>
+          </a:effectRef>
+          <a:fontRef idx="minor">
+            <a:schemeClr val="tx1"/>
+          </a:fontRef>
+        </p:style>
+      </p:cxnSp>
+    </p:spTree>
+    <p:extLst>
+      <p:ext uri="{BB962C8B-B14F-4D97-AF65-F5344CB8AC3E}">
+        <p14:creationId xmlns:p14="http://schemas.microsoft.com/office/powerpoint/2010/main" val="2520833727"/>
+      </p:ext>
+    </p:extLst>
+  </p:cSld>
+  <p:clrMapOvr>
+    <a:masterClrMapping/>
+  </p:clrMapOvr>
+</p:sld>
+</file>
+
+<file path=ppt/slides/slide4.xml><?xml version="1.0" encoding="utf-8"?>
+<p:sld xmlns:a="http://schemas.openxmlformats.org/drawingml/2006/main" xmlns:r="http://schemas.openxmlformats.org/officeDocument/2006/relationships" xmlns:p="http://schemas.openxmlformats.org/presentationml/2006/main">
+  <p:cSld>
+    <p:spTree>
+      <p:nvGrpSpPr>
+        <p:cNvPr id="1" name=""/>
+        <p:cNvGrpSpPr/>
+        <p:nvPr/>
+      </p:nvGrpSpPr>
+      <p:grpSpPr>
+        <a:xfrm>
+          <a:off x="0" y="0"/>
+          <a:ext cx="0" cy="0"/>
+          <a:chOff x="0" y="0"/>
+          <a:chExt cx="0" cy="0"/>
+        </a:xfrm>
+      </p:grpSpPr>
+      <p:sp>
+        <p:nvSpPr>
+          <p:cNvPr id="2" name="Content Placeholder 1"/>
+          <p:cNvSpPr>
+            <a:spLocks noGrp="1"/>
+          </p:cNvSpPr>
+          <p:nvPr>
+            <p:ph idx="1"/>
+          </p:nvPr>
+        </p:nvSpPr>
+        <p:spPr/>
+        <p:txBody>
+          <a:bodyPr/>
+          <a:lstStyle/>
+          <a:p>
+            <a:r>
+              <a:rPr lang="en-US" dirty="0" smtClean="0"/>
+              <a:t>Peter</a:t>
+            </a:r>
+          </a:p>
+          <a:p>
+            <a:pPr lvl="1"/>
+            <a:r>
+              <a:rPr lang="en-US" dirty="0" smtClean="0"/>
+              <a:t>Imported and modified previous projects to work within the GUI</a:t>
+            </a:r>
+          </a:p>
+          <a:p>
+            <a:pPr lvl="1"/>
+            <a:r>
+              <a:rPr lang="en-US" dirty="0" smtClean="0"/>
+              <a:t>Created look and feel of GUI</a:t>
+            </a:r>
+          </a:p>
+          <a:p>
+            <a:pPr lvl="1"/>
+            <a:r>
+              <a:rPr lang="en-US" dirty="0" smtClean="0"/>
+              <a:t>Implemented multiple picture filters</a:t>
+            </a:r>
+          </a:p>
+          <a:p>
+            <a:r>
+              <a:rPr lang="en-US" dirty="0" smtClean="0"/>
+              <a:t>Aaron</a:t>
+            </a:r>
+          </a:p>
+          <a:p>
+            <a:pPr lvl="1"/>
+            <a:r>
+              <a:rPr lang="en-US" dirty="0" smtClean="0"/>
+              <a:t>Imported and modified previous projects to work within the GUI </a:t>
+            </a:r>
+          </a:p>
+          <a:p>
+            <a:pPr lvl="1"/>
+            <a:r>
+              <a:rPr lang="en-US" dirty="0" smtClean="0"/>
+              <a:t>Provided text for GUI</a:t>
+            </a:r>
+          </a:p>
+          <a:p>
+            <a:pPr lvl="1"/>
+            <a:r>
+              <a:rPr lang="en-US" dirty="0" smtClean="0"/>
+              <a:t>Implemented multiple picture filters</a:t>
+            </a:r>
+            <a:endParaRPr lang="en-US" dirty="0"/>
+          </a:p>
+        </p:txBody>
+      </p:sp>
+      <p:sp>
+        <p:nvSpPr>
+          <p:cNvPr id="3" name="Title 2"/>
+          <p:cNvSpPr>
+            <a:spLocks noGrp="1"/>
+          </p:cNvSpPr>
+          <p:nvPr>
+            <p:ph type="title"/>
+          </p:nvPr>
+        </p:nvSpPr>
+        <p:spPr/>
+        <p:txBody>
+          <a:bodyPr/>
+          <a:lstStyle/>
+          <a:p>
+            <a:r>
+              <a:rPr lang="en-US" dirty="0" smtClean="0"/>
+              <a:t>Results</a:t>
+            </a:r>
+            <a:endParaRPr lang="en-US" dirty="0"/>
+          </a:p>
+        </p:txBody>
+      </p:sp>
+    </p:spTree>
+    <p:extLst>
+      <p:ext uri="{BB962C8B-B14F-4D97-AF65-F5344CB8AC3E}">
+        <p14:creationId xmlns:p14="http://schemas.microsoft.com/office/powerpoint/2010/main" val="4278631056"/>
+      </p:ext>
+    </p:extLst>
+  </p:cSld>
+  <p:clrMapOvr>
+    <a:masterClrMapping/>
+  </p:clrMapOvr>
+</p:sld>
+</file>
+
+<file path=ppt/slides/slide5.xml><?xml version="1.0" encoding="utf-8"?>
+<p:sld xmlns:a="http://schemas.openxmlformats.org/drawingml/2006/main" xmlns:r="http://schemas.openxmlformats.org/officeDocument/2006/relationships" xmlns:p="http://schemas.openxmlformats.org/presentationml/2006/main">
+  <p:cSld>
+    <p:spTree>
+      <p:nvGrpSpPr>
+        <p:cNvPr id="1" name=""/>
+        <p:cNvGrpSpPr/>
+        <p:nvPr/>
+      </p:nvGrpSpPr>
+      <p:grpSpPr>
+        <a:xfrm>
+          <a:off x="0" y="0"/>
+          <a:ext cx="0" cy="0"/>
+          <a:chOff x="0" y="0"/>
+          <a:chExt cx="0" cy="0"/>
+        </a:xfrm>
+      </p:grpSpPr>
+      <p:sp>
+        <p:nvSpPr>
+          <p:cNvPr id="2" name="Content Placeholder 1"/>
+          <p:cNvSpPr>
+            <a:spLocks noGrp="1"/>
+          </p:cNvSpPr>
+          <p:nvPr>
+            <p:ph idx="1"/>
+          </p:nvPr>
+        </p:nvSpPr>
+        <p:spPr>
+          <a:xfrm>
+            <a:off x="777240" y="696193"/>
+            <a:ext cx="4599709" cy="571500"/>
+          </a:xfrm>
+        </p:spPr>
+        <p:txBody>
+          <a:bodyPr>
+            <a:normAutofit/>
+          </a:bodyPr>
+          <a:lstStyle/>
+          <a:p>
+            <a:r>
+              <a:rPr lang="en-US" sz="2400" dirty="0">
+                <a:effectLst/>
+                <a:hlinkClick r:id="rId2"/>
+              </a:rPr>
+              <a:t>http://youtu.be/Q-JD0xu_slc</a:t>
+            </a:r>
+            <a:endParaRPr lang="en-US" sz="2400" dirty="0"/>
+          </a:p>
+        </p:txBody>
+      </p:sp>
+      <p:sp>
+        <p:nvSpPr>
+          <p:cNvPr id="3" name="Title 2"/>
+          <p:cNvSpPr>
+            <a:spLocks noGrp="1"/>
+          </p:cNvSpPr>
+          <p:nvPr>
+            <p:ph type="title"/>
+          </p:nvPr>
+        </p:nvSpPr>
+        <p:spPr/>
+        <p:txBody>
+          <a:bodyPr/>
+          <a:lstStyle/>
+          <a:p>
+            <a:r>
+              <a:rPr lang="en-US" dirty="0" smtClean="0"/>
+              <a:t>Demo</a:t>
+            </a:r>
+            <a:endParaRPr lang="en-US" dirty="0"/>
+          </a:p>
+        </p:txBody>
+      </p:sp>
+    </p:spTree>
+    <p:extLst>
+      <p:ext uri="{BB962C8B-B14F-4D97-AF65-F5344CB8AC3E}">
+        <p14:creationId xmlns:p14="http://schemas.microsoft.com/office/powerpoint/2010/main" val="3708001162"/>
+      </p:ext>
+    </p:extLst>
+  </p:cSld>
+  <p:clrMapOvr>
+    <a:masterClrMapping/>
+  </p:clrMapOvr>
+</p:sld>
+</file>
+
+<file path=ppt/slides/slide6.xml><?xml version="1.0" encoding="utf-8"?>
+<p:sld xmlns:a="http://schemas.openxmlformats.org/drawingml/2006/main" xmlns:r="http://schemas.openxmlformats.org/officeDocument/2006/relationships" xmlns:p="http://schemas.openxmlformats.org/presentationml/2006/main">
+  <p:cSld>
+    <p:spTree>
+      <p:nvGrpSpPr>
+        <p:cNvPr id="1" name=""/>
+        <p:cNvGrpSpPr/>
+        <p:nvPr/>
+      </p:nvGrpSpPr>
+      <p:grpSpPr>
+        <a:xfrm>
+          <a:off x="0" y="0"/>
+          <a:ext cx="0" cy="0"/>
+          <a:chOff x="0" y="0"/>
+          <a:chExt cx="0" cy="0"/>
+        </a:xfrm>
+      </p:grpSpPr>
+      <p:sp>
+        <p:nvSpPr>
+          <p:cNvPr id="2" name="Content Placeholder 1"/>
+          <p:cNvSpPr>
+            <a:spLocks noGrp="1"/>
+          </p:cNvSpPr>
+          <p:nvPr>
+            <p:ph idx="1"/>
+          </p:nvPr>
+        </p:nvSpPr>
+        <p:spPr/>
+        <p:txBody>
+          <a:bodyPr/>
+          <a:lstStyle/>
+          <a:p>
+            <a:endParaRPr lang="en-US" dirty="0"/>
+          </a:p>
+        </p:txBody>
+      </p:sp>
+      <p:sp>
+        <p:nvSpPr>
+          <p:cNvPr id="3" name="Title 2"/>
+          <p:cNvSpPr>
+            <a:spLocks noGrp="1"/>
+          </p:cNvSpPr>
+          <p:nvPr>
+            <p:ph type="title"/>
+          </p:nvPr>
+        </p:nvSpPr>
+        <p:spPr/>
+        <p:txBody>
+          <a:bodyPr/>
+          <a:lstStyle/>
+          <a:p>
+            <a:r>
+              <a:rPr lang="en-US" dirty="0" smtClean="0"/>
+              <a:t>Next Steps</a:t>
+            </a:r>
+            <a:endParaRPr lang="en-US" dirty="0"/>
+          </a:p>
+        </p:txBody>
+      </p:sp>
+    </p:spTree>
+    <p:extLst>
+      <p:ext uri="{BB962C8B-B14F-4D97-AF65-F5344CB8AC3E}">
+        <p14:creationId xmlns:p14="http://schemas.microsoft.com/office/powerpoint/2010/main" val="2346583276"/>
+      </p:ext>
+    </p:extLst>
+  </p:cSld>
+  <p:clrMapOvr>
+    <a:masterClrMapping/>
+  </p:clrMapOvr>
+</p:sld>
+</file>
+
+<file path=ppt/slides/slide7.xml><?xml version="1.0" encoding="utf-8"?>
+<p:sld xmlns:a="http://schemas.openxmlformats.org/drawingml/2006/main" xmlns:r="http://schemas.openxmlformats.org/officeDocument/2006/relationships" xmlns:p="http://schemas.openxmlformats.org/presentationml/2006/main">
+  <p:cSld>
+    <p:spTree>
+      <p:nvGrpSpPr>
+        <p:cNvPr id="1" name=""/>
+        <p:cNvGrpSpPr/>
+        <p:nvPr/>
+      </p:nvGrpSpPr>
+      <p:grpSpPr>
+        <a:xfrm>
+          <a:off x="0" y="0"/>
+          <a:ext cx="0" cy="0"/>
+          <a:chOff x="0" y="0"/>
+          <a:chExt cx="0" cy="0"/>
+        </a:xfrm>
+      </p:grpSpPr>
+      <p:sp>
+        <p:nvSpPr>
+          <p:cNvPr id="2" name="Content Placeholder 1"/>
+          <p:cNvSpPr>
+            <a:spLocks noGrp="1"/>
+          </p:cNvSpPr>
+          <p:nvPr>
+            <p:ph idx="1"/>
+          </p:nvPr>
+        </p:nvSpPr>
+        <p:spPr/>
+        <p:txBody>
+          <a:bodyPr/>
+          <a:lstStyle/>
+          <a:p>
+            <a:r>
+              <a:rPr lang="en-US" dirty="0" smtClean="0"/>
+              <a:t>Peter</a:t>
+            </a:r>
+          </a:p>
+          <a:p>
+            <a:pPr lvl="1"/>
+            <a:r>
+              <a:rPr lang="en-US" dirty="0" smtClean="0"/>
+              <a:t>Ability to program efficiently in Python</a:t>
+            </a:r>
+          </a:p>
+          <a:p>
+            <a:pPr lvl="1"/>
+            <a:r>
+              <a:rPr lang="en-US" dirty="0"/>
+              <a:t>Advantages of version control with </a:t>
+            </a:r>
+            <a:r>
+              <a:rPr lang="en-US" dirty="0" err="1"/>
+              <a:t>Git</a:t>
+            </a:r>
+            <a:endParaRPr lang="en-US" dirty="0"/>
+          </a:p>
+          <a:p>
+            <a:pPr lvl="1"/>
+            <a:r>
+              <a:rPr lang="en-US" dirty="0" smtClean="0"/>
+              <a:t>Team management</a:t>
+            </a:r>
+          </a:p>
+          <a:p>
+            <a:r>
+              <a:rPr lang="en-US" dirty="0" smtClean="0"/>
+              <a:t>Aaron</a:t>
+            </a:r>
+          </a:p>
+          <a:p>
+            <a:pPr lvl="1"/>
+            <a:r>
+              <a:rPr lang="en-US" dirty="0" smtClean="0"/>
+              <a:t>Ability to program efficiently in Python</a:t>
+            </a:r>
+          </a:p>
+          <a:p>
+            <a:pPr lvl="1"/>
+            <a:r>
+              <a:rPr lang="en-US" dirty="0"/>
+              <a:t>How to work with different file formats</a:t>
+            </a:r>
+          </a:p>
+          <a:p>
+            <a:pPr lvl="1"/>
+            <a:r>
+              <a:rPr lang="en-US" dirty="0" smtClean="0"/>
+              <a:t>Patience</a:t>
+            </a:r>
+          </a:p>
+        </p:txBody>
+      </p:sp>
+      <p:sp>
+        <p:nvSpPr>
+          <p:cNvPr id="3" name="Title 2"/>
+          <p:cNvSpPr>
+            <a:spLocks noGrp="1"/>
+          </p:cNvSpPr>
+          <p:nvPr>
+            <p:ph type="title"/>
+          </p:nvPr>
+        </p:nvSpPr>
+        <p:spPr/>
+        <p:txBody>
+          <a:bodyPr/>
+          <a:lstStyle/>
+          <a:p>
+            <a:r>
+              <a:rPr lang="en-US" dirty="0" smtClean="0"/>
+              <a:t>Knowledge gained</a:t>
+            </a:r>
+            <a:endParaRPr lang="en-US" dirty="0"/>
+          </a:p>
+        </p:txBody>
+      </p:sp>
+    </p:spTree>
+    <p:extLst>
+      <p:ext uri="{BB962C8B-B14F-4D97-AF65-F5344CB8AC3E}">
+        <p14:creationId xmlns:p14="http://schemas.microsoft.com/office/powerpoint/2010/main" val="413302463"/>
       </p:ext>
     </p:extLst>
   </p:cSld>

</xml_diff>